<commit_message>
Updated all CV and IP Lessons
</commit_message>
<xml_diff>
--- a/translations/en-us/CoreValues/CVJudging.pptx
+++ b/translations/en-us/CoreValues/CVJudging.pptx
@@ -1,6 +1,6 @@
 
 <file path=ppt/presentation.xml><?xml version="1.0" encoding="utf-8"?>
-<p:presentation xmlns:a="http://schemas.openxmlformats.org/drawingml/2006/main" xmlns:r="http://schemas.openxmlformats.org/officeDocument/2006/relationships" xmlns:p="http://schemas.openxmlformats.org/presentationml/2006/main" autoCompressPictures="0">
+<p:presentation xmlns:a="http://schemas.openxmlformats.org/drawingml/2006/main" xmlns:r="http://schemas.openxmlformats.org/officeDocument/2006/relationships" xmlns:p="http://schemas.openxmlformats.org/presentationml/2006/main" showSpecialPlsOnTitleSld="0" autoCompressPictures="0">
   <p:sldMasterIdLst>
     <p:sldMasterId id="2147483672" r:id="rId1"/>
   </p:sldMasterIdLst>
@@ -204,7 +204,7 @@
           <a:p>
             <a:fld id="{C528CD71-4833-D241-9C24-E07BA428460D}" type="datetimeFigureOut">
               <a:rPr lang="en-US" smtClean="0"/>
-              <a:t>10/27/22</a:t>
+              <a:t>5/29/23</a:t>
             </a:fld>
             <a:endParaRPr lang="en-US"/>
           </a:p>
@@ -1472,9 +1472,9 @@
               <a:rPr lang="en-US"/>
               <a:t>: </a:t>
             </a:r>
-            <a:fld id="{A8EC73E3-3AFE-4243-B0C0-8C181B331849}" type="datetime1">
+            <a:fld id="{B0599773-11A5-944D-8FFA-F86809759A4D}" type="datetime1">
               <a:rPr lang="en-US" smtClean="0"/>
-              <a:t>10/27/22</a:t>
+              <a:t>5/29/23</a:t>
             </a:fld>
             <a:endParaRPr lang="en-US" dirty="0"/>
           </a:p>
@@ -1516,7 +1516,7 @@
           <a:p>
             <a:r>
               <a:rPr lang="en-US"/>
-              <a:t>Copyright 2021, FLLTutorials.com</a:t>
+              <a:t>Copyright 2023, FLLTutorials.com. Last Update 5/29/2023</a:t>
             </a:r>
             <a:endParaRPr lang="en-US" dirty="0"/>
           </a:p>
@@ -1783,9 +1783,9 @@
           <a:bodyPr/>
           <a:lstStyle/>
           <a:p>
-            <a:fld id="{1564DF94-04E7-1E40-A6EF-544E564AA7B0}" type="datetime1">
+            <a:fld id="{BECF15BF-D8D0-7547-BB28-51661AFF6544}" type="datetime1">
               <a:rPr lang="en-US" smtClean="0"/>
-              <a:t>10/27/22</a:t>
+              <a:t>5/29/23</a:t>
             </a:fld>
             <a:endParaRPr lang="en-US" dirty="0"/>
           </a:p>
@@ -1816,7 +1816,7 @@
           <a:p>
             <a:r>
               <a:rPr lang="en-US"/>
-              <a:t>Copyright 2021, FLLTutorials.com</a:t>
+              <a:t>Copyright 2023, FLLTutorials.com. Last Update 5/29/2023</a:t>
             </a:r>
             <a:endParaRPr lang="en-US" dirty="0"/>
           </a:p>
@@ -2042,9 +2042,9 @@
             </a:lvl1pPr>
           </a:lstStyle>
           <a:p>
-            <a:fld id="{C2F2A69B-7FA2-F14B-B27E-F1238BFF3476}" type="datetime1">
+            <a:fld id="{5EAF1571-E5EE-0044-B688-7B99D4F5EAC9}" type="datetime1">
               <a:rPr lang="en-US" smtClean="0"/>
-              <a:t>10/27/22</a:t>
+              <a:t>5/29/23</a:t>
             </a:fld>
             <a:endParaRPr lang="en-US" dirty="0"/>
           </a:p>
@@ -2075,7 +2075,7 @@
           <a:p>
             <a:r>
               <a:rPr lang="en-US"/>
-              <a:t>Copyright 2021, FLLTutorials.com</a:t>
+              <a:t>Copyright 2023, FLLTutorials.com. Last Update 5/29/2023</a:t>
             </a:r>
             <a:endParaRPr lang="en-US" dirty="0"/>
           </a:p>
@@ -2337,9 +2337,9 @@
               <a:rPr lang="en-US"/>
               <a:t>: </a:t>
             </a:r>
-            <a:fld id="{9F18BFE5-D7D5-8E4F-90A1-9D0FB057209C}" type="datetime1">
+            <a:fld id="{47FED357-F72D-6E4C-BE3D-29F42CF1AAC0}" type="datetime1">
               <a:rPr lang="en-US" smtClean="0"/>
-              <a:t>10/27/22</a:t>
+              <a:t>5/29/23</a:t>
             </a:fld>
             <a:endParaRPr lang="en-US" dirty="0"/>
           </a:p>
@@ -2384,7 +2384,7 @@
           <a:p>
             <a:r>
               <a:rPr lang="en-US"/>
-              <a:t>Copyright 2021, FLLTutorials.com</a:t>
+              <a:t>Copyright 2023, FLLTutorials.com. Last Update 5/29/2023</a:t>
             </a:r>
             <a:endParaRPr lang="en-US" dirty="0"/>
           </a:p>
@@ -2793,7 +2793,7 @@
             <a:fld id="{B61BEF0D-F0BB-DE4B-95CE-6DB70DBA9567}" type="datetimeFigureOut">
               <a:rPr lang="en-US" smtClean="0"/>
               <a:pPr/>
-              <a:t>10/27/22</a:t>
+              <a:t>5/29/23</a:t>
             </a:fld>
             <a:endParaRPr lang="en-US" dirty="0"/>
           </a:p>
@@ -3297,9 +3297,9 @@
           <a:bodyPr/>
           <a:lstStyle/>
           <a:p>
-            <a:fld id="{90F759D9-8FC7-F14F-A9C0-9D9A6329A9FC}" type="datetime1">
+            <a:fld id="{2A58A400-2A48-2C41-9893-6F2940CBC17D}" type="datetime1">
               <a:rPr lang="en-US" smtClean="0"/>
-              <a:t>10/27/22</a:t>
+              <a:t>5/29/23</a:t>
             </a:fld>
             <a:endParaRPr lang="en-US" dirty="0"/>
           </a:p>
@@ -3330,7 +3330,7 @@
           <a:p>
             <a:r>
               <a:rPr lang="en-US"/>
-              <a:t>Copyright 2021, FLLTutorials.com</a:t>
+              <a:t>Copyright 2023, FLLTutorials.com. Last Update 5/29/2023</a:t>
             </a:r>
             <a:endParaRPr lang="en-US" dirty="0"/>
           </a:p>
@@ -3747,9 +3747,9 @@
           <a:bodyPr/>
           <a:lstStyle/>
           <a:p>
-            <a:fld id="{E346F097-3E00-6A4D-9807-74929D139299}" type="datetime1">
+            <a:fld id="{2A58FEA2-5998-FB4A-B4B9-5BE8E7226281}" type="datetime1">
               <a:rPr lang="en-US" smtClean="0"/>
-              <a:t>10/27/22</a:t>
+              <a:t>5/29/23</a:t>
             </a:fld>
             <a:endParaRPr lang="en-US" dirty="0"/>
           </a:p>
@@ -3780,7 +3780,7 @@
           <a:p>
             <a:r>
               <a:rPr lang="en-US"/>
-              <a:t>Copyright 2021, FLLTutorials.com</a:t>
+              <a:t>Copyright 2023, FLLTutorials.com. Last Update 5/29/2023</a:t>
             </a:r>
             <a:endParaRPr lang="en-US" dirty="0"/>
           </a:p>
@@ -3933,9 +3933,9 @@
           <a:bodyPr/>
           <a:lstStyle/>
           <a:p>
-            <a:fld id="{FF28E24B-F835-FC43-83A0-7DA7342729F6}" type="datetime1">
+            <a:fld id="{BCBDF66C-1B4D-A540-BF9A-9F0A78123139}" type="datetime1">
               <a:rPr lang="en-US" smtClean="0"/>
-              <a:t>10/27/22</a:t>
+              <a:t>5/29/23</a:t>
             </a:fld>
             <a:endParaRPr lang="en-US" dirty="0"/>
           </a:p>
@@ -3970,7 +3970,7 @@
           <a:p>
             <a:r>
               <a:rPr lang="en-US"/>
-              <a:t>Copyright 2021, FLLTutorials.com</a:t>
+              <a:t>Copyright 2023, FLLTutorials.com. Last Update 5/29/2023</a:t>
             </a:r>
             <a:endParaRPr lang="en-US" dirty="0"/>
           </a:p>
@@ -4065,9 +4065,9 @@
           <a:bodyPr/>
           <a:lstStyle/>
           <a:p>
-            <a:fld id="{1885806B-0BEA-954E-BE6D-AECFBDA2BD64}" type="datetime1">
+            <a:fld id="{278540D9-4CD3-C64D-8BFE-A43F289C7C50}" type="datetime1">
               <a:rPr lang="en-US" smtClean="0"/>
-              <a:t>10/27/22</a:t>
+              <a:t>5/29/23</a:t>
             </a:fld>
             <a:endParaRPr lang="en-US" dirty="0"/>
           </a:p>
@@ -4098,7 +4098,7 @@
           <a:p>
             <a:r>
               <a:rPr lang="en-US"/>
-              <a:t>Copyright 2021, FLLTutorials.com</a:t>
+              <a:t>Copyright 2023, FLLTutorials.com. Last Update 5/29/2023</a:t>
             </a:r>
             <a:endParaRPr lang="en-US" dirty="0"/>
           </a:p>
@@ -4472,9 +4472,9 @@
             </a:lvl1pPr>
           </a:lstStyle>
           <a:p>
-            <a:fld id="{4B167545-DCCE-314F-8FAB-F91B6BCA6FDC}" type="datetime1">
+            <a:fld id="{81816BA6-22FC-7643-9B94-074ACF885DDE}" type="datetime1">
               <a:rPr lang="en-US" smtClean="0"/>
-              <a:t>10/27/22</a:t>
+              <a:t>5/29/23</a:t>
             </a:fld>
             <a:endParaRPr lang="en-US" dirty="0"/>
           </a:p>
@@ -4516,7 +4516,7 @@
           <a:p>
             <a:r>
               <a:rPr lang="en-US"/>
-              <a:t>Copyright 2021, FLLTutorials.com</a:t>
+              <a:t>Copyright 2023, FLLTutorials.com. Last Update 5/29/2023</a:t>
             </a:r>
             <a:endParaRPr lang="en-US" dirty="0"/>
           </a:p>
@@ -4790,9 +4790,9 @@
           <a:bodyPr/>
           <a:lstStyle/>
           <a:p>
-            <a:fld id="{36DA4113-8758-6343-B98E-49A94A0E8AB5}" type="datetime1">
+            <a:fld id="{446FCB52-0199-1646-B4EA-AB538ADB02C3}" type="datetime1">
               <a:rPr lang="en-US" smtClean="0"/>
-              <a:t>10/27/22</a:t>
+              <a:t>5/29/23</a:t>
             </a:fld>
             <a:endParaRPr lang="en-US" dirty="0"/>
           </a:p>
@@ -4823,7 +4823,7 @@
           <a:p>
             <a:r>
               <a:rPr lang="en-US"/>
-              <a:t>Copyright 2021, FLLTutorials.com</a:t>
+              <a:t>Copyright 2023, FLLTutorials.com. Last Update 5/29/2023</a:t>
             </a:r>
             <a:endParaRPr lang="en-US" dirty="0"/>
           </a:p>
@@ -5150,9 +5150,9 @@
               <a:rPr lang="en-US"/>
               <a:t>: </a:t>
             </a:r>
-            <a:fld id="{82438690-5311-F948-AE1C-C4B03E4DD04B}" type="datetime1">
+            <a:fld id="{FAA321E8-DDA5-504D-8DAC-E0DBE3176D51}" type="datetime1">
               <a:rPr lang="en-US" smtClean="0"/>
-              <a:t>10/27/22</a:t>
+              <a:t>5/29/23</a:t>
             </a:fld>
             <a:endParaRPr lang="en-US" dirty="0"/>
           </a:p>
@@ -5200,7 +5200,7 @@
           <a:p>
             <a:r>
               <a:rPr lang="en-US"/>
-              <a:t>Copyright 2021, FLLTutorials.com</a:t>
+              <a:t>Copyright 2023, FLLTutorials.com. Last Update 5/29/2023</a:t>
             </a:r>
             <a:endParaRPr lang="en-US" dirty="0"/>
           </a:p>
@@ -5784,7 +5784,7 @@
           <a:p>
             <a:r>
               <a:rPr lang="en-US" dirty="0"/>
-              <a:t>MEET THE TEAM</a:t>
+              <a:t>MEET THE AUTHORS</a:t>
             </a:r>
           </a:p>
         </p:txBody>
@@ -5811,12 +5811,8 @@
           <a:lstStyle/>
           <a:p>
             <a:r>
-              <a:rPr lang="en-US" dirty="0"/>
-              <a:t>Copyright 2022, </a:t>
-            </a:r>
-            <a:r>
-              <a:rPr lang="en-US" dirty="0" err="1"/>
-              <a:t>FLLTutorials.com</a:t>
+              <a:rPr lang="en-US"/>
+              <a:t>Copyright 2023, FLLTutorials.com. Last Update 5/29/2023</a:t>
             </a:r>
             <a:endParaRPr lang="en-US" dirty="0"/>
           </a:p>
@@ -6380,7 +6376,7 @@
               <a:buNone/>
             </a:pPr>
             <a:r>
-              <a:rPr lang="en-US" b="0" i="0" u="none" strike="noStrike" cap="none" dirty="0">
+              <a:rPr lang="en-US" b="0" i="0" u="none" strike="noStrike" cap="none">
                 <a:solidFill>
                   <a:srgbClr val="2D58AC"/>
                 </a:solidFill>
@@ -6389,19 +6385,7 @@
                 <a:cs typeface="Cabin"/>
                 <a:sym typeface="Cabin"/>
               </a:rPr>
-              <a:t>Copyright 2022, </a:t>
-            </a:r>
-            <a:r>
-              <a:rPr lang="en-US" b="0" i="0" u="none" strike="noStrike" cap="none" dirty="0" err="1">
-                <a:solidFill>
-                  <a:srgbClr val="2D58AC"/>
-                </a:solidFill>
-                <a:latin typeface="Cabin"/>
-                <a:ea typeface="Cabin"/>
-                <a:cs typeface="Cabin"/>
-                <a:sym typeface="Cabin"/>
-              </a:rPr>
-              <a:t>FLLTutorials.com</a:t>
+              <a:t>Copyright 2023, FLLTutorials.com. Last Update 5/29/2023</a:t>
             </a:r>
             <a:endParaRPr sz="1000" dirty="0"/>
           </a:p>
@@ -6580,7 +6564,7 @@
             </a:pPr>
             <a:r>
               <a:rPr lang="en-US" sz="2400" dirty="0"/>
-              <a:t>Core Values judging is a lot of fun. It’s your team’s chance to share its identity.  </a:t>
+              <a:t>Core Values judging is a lot of fun. It is your team’s chance to share its identity.  </a:t>
             </a:r>
           </a:p>
           <a:p>
@@ -6595,7 +6579,7 @@
             </a:pPr>
             <a:r>
               <a:rPr lang="en-US" sz="2400" dirty="0"/>
-              <a:t>It’s your chance to share your team goals and why being a part of FLL is important to you. These are some things you can cover in the Team Welcome.</a:t>
+              <a:t>It is your chance to share your team goals and why being a part of FLL is important to you. These are some things you can cover in the Team Welcome.</a:t>
             </a:r>
             <a:endParaRPr sz="2400" dirty="0"/>
           </a:p>
@@ -6660,7 +6644,7 @@
               <a:buNone/>
             </a:pPr>
             <a:r>
-              <a:rPr lang="en-US" b="0" i="0" u="none" strike="noStrike" cap="none" dirty="0">
+              <a:rPr lang="en-US" b="0" i="0" u="none" strike="noStrike" cap="none">
                 <a:solidFill>
                   <a:srgbClr val="2D58AC"/>
                 </a:solidFill>
@@ -6669,19 +6653,7 @@
                 <a:cs typeface="Cabin"/>
                 <a:sym typeface="Cabin"/>
               </a:rPr>
-              <a:t>Copyright 2022, </a:t>
-            </a:r>
-            <a:r>
-              <a:rPr lang="en-US" b="0" i="0" u="none" strike="noStrike" cap="none" dirty="0" err="1">
-                <a:solidFill>
-                  <a:srgbClr val="2D58AC"/>
-                </a:solidFill>
-                <a:latin typeface="Cabin"/>
-                <a:ea typeface="Cabin"/>
-                <a:cs typeface="Cabin"/>
-                <a:sym typeface="Cabin"/>
-              </a:rPr>
-              <a:t>FLLTutorials.com</a:t>
+              <a:t>Copyright 2023, FLLTutorials.com. Last Update 5/29/2023</a:t>
             </a:r>
             <a:endParaRPr sz="1000" dirty="0"/>
           </a:p>
@@ -6900,7 +6872,15 @@
             </a:pPr>
             <a:r>
               <a:rPr lang="en-US" sz="2200" dirty="0"/>
-              <a:t>Be sure to cite specific examples of how your team used or applied each of the Core Values during the season</a:t>
+              <a:t>Be sure to cite </a:t>
+            </a:r>
+            <a:r>
+              <a:rPr lang="en-US" sz="2200" u="sng" dirty="0"/>
+              <a:t>specific examples</a:t>
+            </a:r>
+            <a:r>
+              <a:rPr lang="en-US" sz="2200" dirty="0"/>
+              <a:t> of how your team used or applied each of the Core Values during the season</a:t>
             </a:r>
           </a:p>
           <a:p>
@@ -6914,7 +6894,15 @@
             </a:pPr>
             <a:r>
               <a:rPr lang="en-US" sz="2200" dirty="0"/>
-              <a:t>Make sure that multiple students can give examples</a:t>
+              <a:t>Make sure that </a:t>
+            </a:r>
+            <a:r>
+              <a:rPr lang="en-US" sz="2200" u="sng" dirty="0"/>
+              <a:t>multiple</a:t>
+            </a:r>
+            <a:r>
+              <a:rPr lang="en-US" sz="2200" dirty="0"/>
+              <a:t> students can give examples</a:t>
             </a:r>
           </a:p>
           <a:p>
@@ -6955,12 +6943,8 @@
           <a:lstStyle/>
           <a:p>
             <a:r>
-              <a:rPr lang="en-US" dirty="0"/>
-              <a:t>Copyright 2022, </a:t>
-            </a:r>
-            <a:r>
-              <a:rPr lang="en-US" dirty="0" err="1"/>
-              <a:t>FLLTutorials.com</a:t>
+              <a:rPr lang="en-US"/>
+              <a:t>Copyright 2023, FLLTutorials.com. Last Update 5/29/2023</a:t>
             </a:r>
             <a:endParaRPr lang="en-US" dirty="0"/>
           </a:p>
@@ -7183,12 +7167,8 @@
           <a:lstStyle/>
           <a:p>
             <a:r>
-              <a:rPr lang="en-US" dirty="0"/>
-              <a:t>Copyright 2022, </a:t>
-            </a:r>
-            <a:r>
-              <a:rPr lang="en-US" dirty="0" err="1"/>
-              <a:t>FLLTutorials.com</a:t>
+              <a:rPr lang="en-US"/>
+              <a:t>Copyright 2023, FLLTutorials.com. Last Update 5/29/2023</a:t>
             </a:r>
             <a:endParaRPr lang="en-US" dirty="0"/>
           </a:p>
@@ -7460,7 +7440,7 @@
               <a:buNone/>
             </a:pPr>
             <a:r>
-              <a:rPr lang="en-US" b="0" i="0" u="none" strike="noStrike" cap="none" dirty="0">
+              <a:rPr lang="en-US" b="0" i="0" u="none" strike="noStrike" cap="none">
                 <a:solidFill>
                   <a:srgbClr val="2D58AC"/>
                 </a:solidFill>
@@ -7469,19 +7449,7 @@
                 <a:cs typeface="Cabin"/>
                 <a:sym typeface="Cabin"/>
               </a:rPr>
-              <a:t>Copyright 2022, </a:t>
-            </a:r>
-            <a:r>
-              <a:rPr lang="en-US" b="0" i="0" u="none" strike="noStrike" cap="none" dirty="0" err="1">
-                <a:solidFill>
-                  <a:srgbClr val="2D58AC"/>
-                </a:solidFill>
-                <a:latin typeface="Cabin"/>
-                <a:ea typeface="Cabin"/>
-                <a:cs typeface="Cabin"/>
-                <a:sym typeface="Cabin"/>
-              </a:rPr>
-              <a:t>FLLTutorials.com</a:t>
+              <a:t>Copyright 2023, FLLTutorials.com. Last Update 5/29/2023</a:t>
             </a:r>
             <a:endParaRPr b="0" i="0" u="none" strike="noStrike" cap="none" dirty="0">
               <a:solidFill>
@@ -7863,7 +7831,7 @@
               <a:buNone/>
             </a:pPr>
             <a:r>
-              <a:rPr lang="en-US" sz="1800" b="0" i="0" u="none" strike="noStrike" cap="none" dirty="0">
+              <a:rPr lang="en-US" sz="1800" b="0" i="0" u="none" strike="noStrike" cap="none">
                 <a:solidFill>
                   <a:srgbClr val="2D58AC"/>
                 </a:solidFill>
@@ -7872,19 +7840,7 @@
                 <a:cs typeface="Cabin"/>
                 <a:sym typeface="Cabin"/>
               </a:rPr>
-              <a:t>Copyright 2022, </a:t>
-            </a:r>
-            <a:r>
-              <a:rPr lang="en-US" sz="1800" b="0" i="0" u="none" strike="noStrike" cap="none" dirty="0" err="1">
-                <a:solidFill>
-                  <a:srgbClr val="2D58AC"/>
-                </a:solidFill>
-                <a:latin typeface="Cabin"/>
-                <a:ea typeface="Cabin"/>
-                <a:cs typeface="Cabin"/>
-                <a:sym typeface="Cabin"/>
-              </a:rPr>
-              <a:t>FLLTutorials.com</a:t>
+              <a:t>Copyright 2023, FLLTutorials.com. Last Update 5/29/2023</a:t>
             </a:r>
             <a:endParaRPr sz="1800" b="0" i="0" u="none" strike="noStrike" cap="none" dirty="0">
               <a:solidFill>

</xml_diff>

<commit_message>
updated CV judging with sample questions and FAQ
</commit_message>
<xml_diff>
--- a/translations/en-us/CoreValues/CVJudging.pptx
+++ b/translations/en-us/CoreValues/CVJudging.pptx
@@ -5,7 +5,7 @@
     <p:sldMasterId id="2147483672" r:id="rId1"/>
   </p:sldMasterIdLst>
   <p:notesMasterIdLst>
-    <p:notesMasterId r:id="rId10"/>
+    <p:notesMasterId r:id="rId12"/>
   </p:notesMasterIdLst>
   <p:sldIdLst>
     <p:sldId id="256" r:id="rId2"/>
@@ -15,7 +15,9 @@
     <p:sldId id="263" r:id="rId6"/>
     <p:sldId id="258" r:id="rId7"/>
     <p:sldId id="259" r:id="rId8"/>
-    <p:sldId id="267" r:id="rId9"/>
+    <p:sldId id="399" r:id="rId9"/>
+    <p:sldId id="400" r:id="rId10"/>
+    <p:sldId id="267" r:id="rId11"/>
   </p:sldIdLst>
   <p:sldSz cx="9144000" cy="6858000" type="screen4x3"/>
   <p:notesSz cx="6858000" cy="9144000"/>
@@ -5724,10 +5726,9 @@
           <a:lstStyle/>
           <a:p>
             <a:r>
-              <a:rPr lang="en-US"/>
-              <a:t>Bayou Builders</a:t>
-            </a:r>
-            <a:endParaRPr lang="en-US" dirty="0"/>
+              <a:rPr lang="en-US" dirty="0"/>
+              <a:t>Bayou Builders  AND SESHAN BROTHERS</a:t>
+            </a:r>
           </a:p>
         </p:txBody>
       </p:sp>
@@ -5735,6 +5736,452 @@
     <p:extLst>
       <p:ext uri="{BB962C8B-B14F-4D97-AF65-F5344CB8AC3E}">
         <p14:creationId xmlns:p14="http://schemas.microsoft.com/office/powerpoint/2010/main" val="892384379"/>
+      </p:ext>
+    </p:extLst>
+  </p:cSld>
+  <p:clrMapOvr>
+    <a:masterClrMapping/>
+  </p:clrMapOvr>
+</p:sld>
+</file>
+
+<file path=ppt/slides/slide10.xml><?xml version="1.0" encoding="utf-8"?>
+<p:sld xmlns:a="http://schemas.openxmlformats.org/drawingml/2006/main" xmlns:r="http://schemas.openxmlformats.org/officeDocument/2006/relationships" xmlns:p="http://schemas.openxmlformats.org/presentationml/2006/main">
+  <p:cSld>
+    <p:spTree>
+      <p:nvGrpSpPr>
+        <p:cNvPr id="1" name="Shape 207"/>
+        <p:cNvGrpSpPr/>
+        <p:nvPr/>
+      </p:nvGrpSpPr>
+      <p:grpSpPr>
+        <a:xfrm>
+          <a:off x="0" y="0"/>
+          <a:ext cx="0" cy="0"/>
+          <a:chOff x="0" y="0"/>
+          <a:chExt cx="0" cy="0"/>
+        </a:xfrm>
+      </p:grpSpPr>
+      <p:sp>
+        <p:nvSpPr>
+          <p:cNvPr id="208" name="Shape 208"/>
+          <p:cNvSpPr txBox="1">
+            <a:spLocks noGrp="1"/>
+          </p:cNvSpPr>
+          <p:nvPr>
+            <p:ph type="title"/>
+          </p:nvPr>
+        </p:nvSpPr>
+        <p:spPr>
+          <a:prstGeom prst="rect">
+            <a:avLst/>
+          </a:prstGeom>
+          <a:noFill/>
+          <a:ln>
+            <a:noFill/>
+          </a:ln>
+        </p:spPr>
+        <p:txBody>
+          <a:bodyPr spcFirstLastPara="1" wrap="square" lIns="91425" tIns="45700" rIns="91425" bIns="45700" anchor="b" anchorCtr="0">
+            <a:noAutofit/>
+          </a:bodyPr>
+          <a:lstStyle/>
+          <a:p>
+            <a:pPr marL="0" marR="0" lvl="0" indent="0" algn="l" rtl="0">
+              <a:spcBef>
+                <a:spcPts val="0"/>
+              </a:spcBef>
+              <a:spcAft>
+                <a:spcPts val="0"/>
+              </a:spcAft>
+              <a:buClr>
+                <a:schemeClr val="lt1"/>
+              </a:buClr>
+              <a:buSzPts val="2800"/>
+              <a:buFont typeface="Cabin"/>
+              <a:buNone/>
+            </a:pPr>
+            <a:r>
+              <a:rPr lang="en-US" sz="2800" b="0" i="0" u="none" strike="noStrike" cap="none">
+                <a:solidFill>
+                  <a:schemeClr val="lt1"/>
+                </a:solidFill>
+                <a:latin typeface="Cabin"/>
+                <a:ea typeface="Cabin"/>
+                <a:cs typeface="Cabin"/>
+                <a:sym typeface="Cabin"/>
+              </a:rPr>
+              <a:t>CREDITS</a:t>
+            </a:r>
+            <a:endParaRPr/>
+          </a:p>
+        </p:txBody>
+      </p:sp>
+      <p:sp>
+        <p:nvSpPr>
+          <p:cNvPr id="209" name="Shape 209"/>
+          <p:cNvSpPr txBox="1">
+            <a:spLocks noGrp="1"/>
+          </p:cNvSpPr>
+          <p:nvPr>
+            <p:ph idx="1"/>
+          </p:nvPr>
+        </p:nvSpPr>
+        <p:spPr>
+          <a:prstGeom prst="rect">
+            <a:avLst/>
+          </a:prstGeom>
+          <a:noFill/>
+          <a:ln>
+            <a:noFill/>
+          </a:ln>
+        </p:spPr>
+        <p:txBody>
+          <a:bodyPr spcFirstLastPara="1" wrap="square" lIns="91425" tIns="45700" rIns="91425" bIns="45700" anchor="t" anchorCtr="0">
+            <a:noAutofit/>
+          </a:bodyPr>
+          <a:lstStyle/>
+          <a:p>
+            <a:pPr>
+              <a:spcBef>
+                <a:spcPts val="0"/>
+              </a:spcBef>
+              <a:spcAft>
+                <a:spcPts val="0"/>
+              </a:spcAft>
+              <a:buSzPts val="2576"/>
+            </a:pPr>
+            <a:r>
+              <a:rPr lang="en-US" sz="2800" b="0" i="0" u="none" strike="noStrike" cap="none" dirty="0">
+                <a:solidFill>
+                  <a:schemeClr val="dk2"/>
+                </a:solidFill>
+                <a:latin typeface="Cabin"/>
+                <a:ea typeface="Cabin"/>
+                <a:cs typeface="Cabin"/>
+                <a:sym typeface="Cabin"/>
+              </a:rPr>
+              <a:t>This lesson was written by</a:t>
+            </a:r>
+            <a:r>
+              <a:rPr lang="en-US" sz="2800" dirty="0"/>
+              <a:t> the Bayou Builders (</a:t>
+            </a:r>
+            <a:r>
+              <a:rPr lang="en-US" sz="2800" dirty="0">
+                <a:hlinkClick r:id="rId3"/>
+              </a:rPr>
+              <a:t>https://www.bayoubuilders.org/</a:t>
+            </a:r>
+            <a:r>
+              <a:rPr lang="en-US" sz="2800" dirty="0"/>
+              <a:t>) and the Seshan Brothers</a:t>
+            </a:r>
+            <a:endParaRPr dirty="0"/>
+          </a:p>
+          <a:p>
+            <a:pPr>
+              <a:spcBef>
+                <a:spcPts val="1160"/>
+              </a:spcBef>
+              <a:spcAft>
+                <a:spcPts val="0"/>
+              </a:spcAft>
+              <a:buSzPts val="2576"/>
+            </a:pPr>
+            <a:r>
+              <a:rPr lang="en-US" sz="2800" b="0" i="0" u="none" strike="noStrike" cap="none" dirty="0">
+                <a:solidFill>
+                  <a:schemeClr val="dk2"/>
+                </a:solidFill>
+                <a:latin typeface="Cabin"/>
+                <a:ea typeface="Cabin"/>
+                <a:cs typeface="Cabin"/>
+                <a:sym typeface="Cabin"/>
+              </a:rPr>
+              <a:t>More lessons for FIRST LEGO League are available at </a:t>
+            </a:r>
+            <a:r>
+              <a:rPr lang="en-US" sz="2800" b="0" i="0" u="sng" strike="noStrike" cap="none" dirty="0">
+                <a:solidFill>
+                  <a:schemeClr val="hlink"/>
+                </a:solidFill>
+                <a:latin typeface="Cabin"/>
+                <a:ea typeface="Cabin"/>
+                <a:cs typeface="Cabin"/>
+                <a:sym typeface="Cabin"/>
+                <a:hlinkClick r:id="rId4"/>
+              </a:rPr>
+              <a:t>www.flltutorials.com</a:t>
+            </a:r>
+            <a:endParaRPr sz="2800" b="0" i="0" u="none" strike="noStrike" cap="none" dirty="0">
+              <a:solidFill>
+                <a:srgbClr val="0070C0"/>
+              </a:solidFill>
+              <a:latin typeface="Cabin"/>
+              <a:ea typeface="Cabin"/>
+              <a:cs typeface="Cabin"/>
+              <a:sym typeface="Cabin"/>
+            </a:endParaRPr>
+          </a:p>
+          <a:p>
+            <a:pPr marL="306000" marR="0" lvl="0" indent="-142424" algn="l" rtl="0">
+              <a:spcBef>
+                <a:spcPts val="1160"/>
+              </a:spcBef>
+              <a:spcAft>
+                <a:spcPts val="0"/>
+              </a:spcAft>
+              <a:buClr>
+                <a:schemeClr val="accent2"/>
+              </a:buClr>
+              <a:buSzPts val="2576"/>
+              <a:buFont typeface="Noto Sans Symbols"/>
+              <a:buNone/>
+            </a:pPr>
+            <a:endParaRPr sz="2800" b="0" i="0" u="none" strike="noStrike" cap="none" dirty="0">
+              <a:solidFill>
+                <a:schemeClr val="dk2"/>
+              </a:solidFill>
+              <a:latin typeface="Cabin"/>
+              <a:ea typeface="Cabin"/>
+              <a:cs typeface="Cabin"/>
+              <a:sym typeface="Cabin"/>
+            </a:endParaRPr>
+          </a:p>
+          <a:p>
+            <a:pPr marL="306000" marR="0" lvl="0" indent="-95688" algn="l" rtl="0">
+              <a:spcBef>
+                <a:spcPts val="1320"/>
+              </a:spcBef>
+              <a:spcAft>
+                <a:spcPts val="0"/>
+              </a:spcAft>
+              <a:buClr>
+                <a:schemeClr val="accent2"/>
+              </a:buClr>
+              <a:buSzPts val="3312"/>
+              <a:buFont typeface="Noto Sans Symbols"/>
+              <a:buNone/>
+            </a:pPr>
+            <a:endParaRPr sz="3600" b="0" i="0" u="none" strike="noStrike" cap="none" dirty="0">
+              <a:solidFill>
+                <a:schemeClr val="dk2"/>
+              </a:solidFill>
+              <a:latin typeface="Cabin"/>
+              <a:ea typeface="Cabin"/>
+              <a:cs typeface="Cabin"/>
+              <a:sym typeface="Cabin"/>
+            </a:endParaRPr>
+          </a:p>
+        </p:txBody>
+      </p:sp>
+      <p:sp>
+        <p:nvSpPr>
+          <p:cNvPr id="211" name="Shape 211"/>
+          <p:cNvSpPr txBox="1">
+            <a:spLocks noGrp="1"/>
+          </p:cNvSpPr>
+          <p:nvPr>
+            <p:ph type="ftr" sz="quarter" idx="11"/>
+          </p:nvPr>
+        </p:nvSpPr>
+        <p:spPr>
+          <a:prstGeom prst="rect">
+            <a:avLst/>
+          </a:prstGeom>
+          <a:noFill/>
+          <a:ln>
+            <a:noFill/>
+          </a:ln>
+        </p:spPr>
+        <p:txBody>
+          <a:bodyPr spcFirstLastPara="1" wrap="square" lIns="91425" tIns="45700" rIns="91425" bIns="45700" anchor="t" anchorCtr="0">
+            <a:noAutofit/>
+          </a:bodyPr>
+          <a:lstStyle/>
+          <a:p>
+            <a:pPr marL="0" marR="0" lvl="0" indent="0" algn="l" rtl="0">
+              <a:spcBef>
+                <a:spcPts val="0"/>
+              </a:spcBef>
+              <a:spcAft>
+                <a:spcPts val="0"/>
+              </a:spcAft>
+              <a:buNone/>
+            </a:pPr>
+            <a:r>
+              <a:rPr lang="en-US" sz="1800" b="0" i="0" u="none" strike="noStrike" cap="none">
+                <a:solidFill>
+                  <a:srgbClr val="2D58AC"/>
+                </a:solidFill>
+                <a:latin typeface="Cabin"/>
+                <a:ea typeface="Cabin"/>
+                <a:cs typeface="Cabin"/>
+                <a:sym typeface="Cabin"/>
+              </a:rPr>
+              <a:t>Copyright 2023, FLLTutorials.com. Last Update 5/29/2023</a:t>
+            </a:r>
+            <a:endParaRPr sz="1800" b="0" i="0" u="none" strike="noStrike" cap="none" dirty="0">
+              <a:solidFill>
+                <a:srgbClr val="2D58AC"/>
+              </a:solidFill>
+              <a:latin typeface="Cabin"/>
+              <a:ea typeface="Cabin"/>
+              <a:cs typeface="Cabin"/>
+              <a:sym typeface="Cabin"/>
+            </a:endParaRPr>
+          </a:p>
+        </p:txBody>
+      </p:sp>
+      <p:sp>
+        <p:nvSpPr>
+          <p:cNvPr id="212" name="Shape 212"/>
+          <p:cNvSpPr txBox="1">
+            <a:spLocks noGrp="1"/>
+          </p:cNvSpPr>
+          <p:nvPr>
+            <p:ph type="sldNum" sz="quarter" idx="12"/>
+          </p:nvPr>
+        </p:nvSpPr>
+        <p:spPr>
+          <a:prstGeom prst="rect">
+            <a:avLst/>
+          </a:prstGeom>
+          <a:noFill/>
+          <a:ln>
+            <a:noFill/>
+          </a:ln>
+        </p:spPr>
+        <p:txBody>
+          <a:bodyPr spcFirstLastPara="1" wrap="square" lIns="91425" tIns="45700" rIns="91425" bIns="45700" anchor="t" anchorCtr="0">
+            <a:noAutofit/>
+          </a:bodyPr>
+          <a:lstStyle/>
+          <a:p>
+            <a:pPr marL="0" marR="0" lvl="0" indent="0" algn="l" rtl="0">
+              <a:spcBef>
+                <a:spcPts val="0"/>
+              </a:spcBef>
+              <a:spcAft>
+                <a:spcPts val="0"/>
+              </a:spcAft>
+              <a:buNone/>
+            </a:pPr>
+            <a:fld id="{00000000-1234-1234-1234-123412341234}" type="slidenum">
+              <a:rPr lang="en-US" sz="1800" b="0" i="0" u="none" strike="noStrike" cap="none">
+                <a:solidFill>
+                  <a:srgbClr val="2D58AC"/>
+                </a:solidFill>
+                <a:latin typeface="Cabin"/>
+                <a:ea typeface="Cabin"/>
+                <a:cs typeface="Cabin"/>
+                <a:sym typeface="Cabin"/>
+              </a:rPr>
+              <a:t>10</a:t>
+            </a:fld>
+            <a:endParaRPr sz="1800" b="0" i="0" u="none" strike="noStrike" cap="none">
+              <a:solidFill>
+                <a:srgbClr val="2D58AC"/>
+              </a:solidFill>
+              <a:latin typeface="Cabin"/>
+              <a:ea typeface="Cabin"/>
+              <a:cs typeface="Cabin"/>
+              <a:sym typeface="Cabin"/>
+            </a:endParaRPr>
+          </a:p>
+        </p:txBody>
+      </p:sp>
+      <p:sp>
+        <p:nvSpPr>
+          <p:cNvPr id="213" name="Shape 213"/>
+          <p:cNvSpPr txBox="1"/>
+          <p:nvPr/>
+        </p:nvSpPr>
+        <p:spPr>
+          <a:xfrm>
+            <a:off x="572568" y="5047077"/>
+            <a:ext cx="7989752" cy="830997"/>
+          </a:xfrm>
+          <a:prstGeom prst="rect">
+            <a:avLst/>
+          </a:prstGeom>
+          <a:noFill/>
+          <a:ln>
+            <a:noFill/>
+          </a:ln>
+        </p:spPr>
+        <p:txBody>
+          <a:bodyPr spcFirstLastPara="1" wrap="square" lIns="91425" tIns="45700" rIns="91425" bIns="45700" anchor="t" anchorCtr="0">
+            <a:noAutofit/>
+          </a:bodyPr>
+          <a:lstStyle/>
+          <a:p>
+            <a:pPr marL="0" marR="0" lvl="0" indent="0" algn="ctr" rtl="0">
+              <a:spcBef>
+                <a:spcPts val="0"/>
+              </a:spcBef>
+              <a:spcAft>
+                <a:spcPts val="0"/>
+              </a:spcAft>
+              <a:buNone/>
+            </a:pPr>
+            <a:r>
+              <a:rPr lang="en-US" sz="2400" b="0" i="0" u="sng" strike="noStrike" cap="none">
+                <a:solidFill>
+                  <a:schemeClr val="hlink"/>
+                </a:solidFill>
+                <a:latin typeface="Cabin"/>
+                <a:ea typeface="Cabin"/>
+                <a:cs typeface="Cabin"/>
+                <a:sym typeface="Cabin"/>
+                <a:hlinkClick r:id="rId5"/>
+              </a:rPr>
+              <a:t>Creative Commons Attribution-NonCommercial-ShareAlike 4.0 International License</a:t>
+            </a:r>
+            <a:endParaRPr sz="2400" b="0" i="0" u="none" strike="noStrike" cap="none">
+              <a:solidFill>
+                <a:schemeClr val="dk1"/>
+              </a:solidFill>
+              <a:latin typeface="Cabin"/>
+              <a:ea typeface="Cabin"/>
+              <a:cs typeface="Cabin"/>
+              <a:sym typeface="Cabin"/>
+            </a:endParaRPr>
+          </a:p>
+        </p:txBody>
+      </p:sp>
+      <p:pic>
+        <p:nvPicPr>
+          <p:cNvPr id="214" name="Shape 214"/>
+          <p:cNvPicPr preferRelativeResize="0"/>
+          <p:nvPr/>
+        </p:nvPicPr>
+        <p:blipFill rotWithShape="1">
+          <a:blip r:embed="rId6">
+            <a:alphaModFix/>
+          </a:blip>
+          <a:srcRect/>
+          <a:stretch/>
+        </p:blipFill>
+        <p:spPr>
+          <a:xfrm>
+            <a:off x="3486559" y="4035813"/>
+            <a:ext cx="2552700" cy="889000"/>
+          </a:xfrm>
+          <a:prstGeom prst="rect">
+            <a:avLst/>
+          </a:prstGeom>
+          <a:noFill/>
+          <a:ln>
+            <a:noFill/>
+          </a:ln>
+        </p:spPr>
+      </p:pic>
+    </p:spTree>
+    <p:extLst>
+      <p:ext uri="{BB962C8B-B14F-4D97-AF65-F5344CB8AC3E}">
+        <p14:creationId xmlns:p14="http://schemas.microsoft.com/office/powerpoint/2010/main" val="4210231749"/>
       </p:ext>
     </p:extLst>
   </p:cSld>
@@ -6310,10 +6757,18 @@
               <a:buSzPts val="2208"/>
             </a:pPr>
             <a:r>
-              <a:rPr lang="en-US" sz="2000" dirty="0"/>
+              <a:rPr lang="en-US" sz="2000" dirty="0">
+                <a:solidFill>
+                  <a:srgbClr val="FF0000"/>
+                </a:solidFill>
+              </a:rPr>
               <a:t>Core Values judges will be listening during the entire session so make sure you talk about Core Values during the Team Welcome, Innovation Project and Robot Design.</a:t>
             </a:r>
-            <a:endParaRPr sz="2000" dirty="0"/>
+            <a:endParaRPr sz="2000" dirty="0">
+              <a:solidFill>
+                <a:srgbClr val="FF0000"/>
+              </a:solidFill>
+            </a:endParaRPr>
           </a:p>
           <a:p>
             <a:pPr marL="0" marR="0" lvl="0" indent="0" algn="l" rtl="0">
@@ -6943,10 +7398,17 @@
           <a:lstStyle/>
           <a:p>
             <a:r>
-              <a:rPr lang="en-US"/>
-              <a:t>Copyright 2023, FLLTutorials.com. Last Update 5/29/2023</a:t>
-            </a:r>
-            <a:endParaRPr lang="en-US" dirty="0"/>
+              <a:rPr lang="en-US" dirty="0"/>
+              <a:t>Copyright 2023, </a:t>
+            </a:r>
+            <a:r>
+              <a:rPr lang="en-US" dirty="0" err="1"/>
+              <a:t>FLLTutorials.com</a:t>
+            </a:r>
+            <a:r>
+              <a:rPr lang="en-US" dirty="0"/>
+              <a:t>. Last Update 5/29/2023</a:t>
+            </a:r>
           </a:p>
         </p:txBody>
       </p:sp>
@@ -7319,15 +7781,7 @@
             </a:pPr>
             <a:r>
               <a:rPr lang="en-US" dirty="0"/>
-              <a:t>TEAM BUILDING ACTIVITY (</a:t>
-            </a:r>
-            <a:r>
-              <a:rPr lang="en-US" dirty="0" err="1"/>
-              <a:t>NoT</a:t>
-            </a:r>
-            <a:r>
-              <a:rPr lang="en-US" dirty="0"/>
-              <a:t> USED)</a:t>
+              <a:t>TEAM BUILDING ACTIVITY</a:t>
             </a:r>
             <a:endParaRPr dirty="0"/>
           </a:p>
@@ -7572,7 +8026,7 @@
   <p:cSld>
     <p:spTree>
       <p:nvGrpSpPr>
-        <p:cNvPr id="1" name="Shape 207"/>
+        <p:cNvPr id="1" name=""/>
         <p:cNvGrpSpPr/>
         <p:nvPr/>
       </p:nvGrpSpPr>
@@ -7586,422 +8040,372 @@
       </p:grpSpPr>
       <p:sp>
         <p:nvSpPr>
-          <p:cNvPr id="208" name="Shape 208"/>
-          <p:cNvSpPr txBox="1">
+          <p:cNvPr id="2" name="Title 1">
+            <a:extLst>
+              <a:ext uri="{FF2B5EF4-FFF2-40B4-BE49-F238E27FC236}">
+                <a16:creationId xmlns:a16="http://schemas.microsoft.com/office/drawing/2014/main" id="{1EFD2DD7-1EBE-9ADE-BC02-ED7C095747C9}"/>
+              </a:ext>
+            </a:extLst>
+          </p:cNvPr>
+          <p:cNvSpPr>
             <a:spLocks noGrp="1"/>
           </p:cNvSpPr>
           <p:nvPr>
             <p:ph type="title"/>
           </p:nvPr>
         </p:nvSpPr>
-        <p:spPr>
-          <a:prstGeom prst="rect">
-            <a:avLst/>
-          </a:prstGeom>
-          <a:noFill/>
-          <a:ln>
-            <a:noFill/>
-          </a:ln>
-        </p:spPr>
-        <p:txBody>
-          <a:bodyPr spcFirstLastPara="1" wrap="square" lIns="91425" tIns="45700" rIns="91425" bIns="45700" anchor="b" anchorCtr="0">
-            <a:noAutofit/>
+        <p:spPr/>
+        <p:txBody>
+          <a:bodyPr/>
+          <a:lstStyle/>
+          <a:p>
+            <a:r>
+              <a:rPr lang="en-US" dirty="0"/>
+              <a:t>FAQs</a:t>
+            </a:r>
+          </a:p>
+        </p:txBody>
+      </p:sp>
+      <p:sp>
+        <p:nvSpPr>
+          <p:cNvPr id="3" name="Content Placeholder 2">
+            <a:extLst>
+              <a:ext uri="{FF2B5EF4-FFF2-40B4-BE49-F238E27FC236}">
+                <a16:creationId xmlns:a16="http://schemas.microsoft.com/office/drawing/2014/main" id="{52B14860-2877-DAD5-77D0-6D070DEEE09C}"/>
+              </a:ext>
+            </a:extLst>
+          </p:cNvPr>
+          <p:cNvSpPr>
+            <a:spLocks noGrp="1"/>
+          </p:cNvSpPr>
+          <p:nvPr>
+            <p:ph idx="1"/>
+          </p:nvPr>
+        </p:nvSpPr>
+        <p:spPr>
+          <a:xfrm>
+            <a:off x="448091" y="1505582"/>
+            <a:ext cx="8238707" cy="4844417"/>
+          </a:xfrm>
+        </p:spPr>
+        <p:txBody>
+          <a:bodyPr>
+            <a:normAutofit fontScale="55000" lnSpcReduction="20000"/>
           </a:bodyPr>
           <a:lstStyle/>
           <a:p>
-            <a:pPr marL="0" marR="0" lvl="0" indent="0" algn="l" rtl="0">
-              <a:spcBef>
-                <a:spcPts val="0"/>
-              </a:spcBef>
-              <a:spcAft>
-                <a:spcPts val="0"/>
-              </a:spcAft>
-              <a:buClr>
-                <a:schemeClr val="lt1"/>
-              </a:buClr>
-              <a:buSzPts val="2800"/>
-              <a:buFont typeface="Cabin"/>
-              <a:buNone/>
-            </a:pPr>
-            <a:r>
-              <a:rPr lang="en-US" sz="2800" b="0" i="0" u="none" strike="noStrike" cap="none">
-                <a:solidFill>
-                  <a:schemeClr val="lt1"/>
-                </a:solidFill>
-                <a:latin typeface="Cabin"/>
-                <a:ea typeface="Cabin"/>
-                <a:cs typeface="Cabin"/>
-                <a:sym typeface="Cabin"/>
-              </a:rPr>
-              <a:t>CREDITS</a:t>
-            </a:r>
-            <a:endParaRPr/>
-          </a:p>
-        </p:txBody>
-      </p:sp>
-      <p:sp>
-        <p:nvSpPr>
-          <p:cNvPr id="209" name="Shape 209"/>
-          <p:cNvSpPr txBox="1">
-            <a:spLocks noGrp="1"/>
-          </p:cNvSpPr>
-          <p:nvPr>
-            <p:ph idx="1"/>
-          </p:nvPr>
-        </p:nvSpPr>
-        <p:spPr>
-          <a:prstGeom prst="rect">
-            <a:avLst/>
-          </a:prstGeom>
-          <a:noFill/>
-          <a:ln>
-            <a:noFill/>
-          </a:ln>
-        </p:spPr>
-        <p:txBody>
-          <a:bodyPr spcFirstLastPara="1" wrap="square" lIns="91425" tIns="45700" rIns="91425" bIns="45700" anchor="t" anchorCtr="0">
-            <a:noAutofit/>
-          </a:bodyPr>
+            <a:r>
+              <a:rPr lang="en-US" dirty="0"/>
+              <a:t>Will we get to give a presentation during the Core Values Reflection component?</a:t>
+            </a:r>
+          </a:p>
+          <a:p>
+            <a:pPr lvl="1"/>
+            <a:r>
+              <a:rPr lang="en-US" dirty="0"/>
+              <a:t>No. Judges are supposed to ask your team questions during this period. Ask ahead of time if presentations are allowed.</a:t>
+            </a:r>
+          </a:p>
+          <a:p>
+            <a:r>
+              <a:rPr lang="en-US" dirty="0"/>
+              <a:t>Then how can I tell the judge about about our team’s Core Values?</a:t>
+            </a:r>
+          </a:p>
+          <a:p>
+            <a:pPr lvl="1"/>
+            <a:r>
+              <a:rPr lang="en-US" dirty="0"/>
+              <a:t>You should include examples through the entire 30mins – e.g. how you picked a project topic together, how you resolved a problem during robot building, how you helped another team, program, etc.</a:t>
+            </a:r>
+          </a:p>
+          <a:p>
+            <a:r>
+              <a:rPr lang="en-US" dirty="0"/>
+              <a:t>Do we need to have a tri-fold or poster?</a:t>
+            </a:r>
+          </a:p>
+          <a:p>
+            <a:pPr lvl="1"/>
+            <a:r>
+              <a:rPr lang="en-US" dirty="0"/>
+              <a:t>No. Some teams will bring one (if allowed). They are not required and simply extra props a team chooses to have.</a:t>
+            </a:r>
+          </a:p>
+          <a:p>
+            <a:r>
+              <a:rPr lang="en-US" dirty="0"/>
+              <a:t>What type of documentation is useful?</a:t>
+            </a:r>
+          </a:p>
+          <a:p>
+            <a:pPr lvl="1"/>
+            <a:r>
+              <a:rPr lang="en-US" dirty="0"/>
+              <a:t>Posters with photographs and a Core Values journal documenting all your activities are common among teams.</a:t>
+            </a:r>
+          </a:p>
+        </p:txBody>
+      </p:sp>
+      <p:sp>
+        <p:nvSpPr>
+          <p:cNvPr id="4" name="Footer Placeholder 3">
+            <a:extLst>
+              <a:ext uri="{FF2B5EF4-FFF2-40B4-BE49-F238E27FC236}">
+                <a16:creationId xmlns:a16="http://schemas.microsoft.com/office/drawing/2014/main" id="{6E024D6D-A137-6C9A-B33F-CE60C20F0F01}"/>
+              </a:ext>
+            </a:extLst>
+          </p:cNvPr>
+          <p:cNvSpPr>
+            <a:spLocks noGrp="1"/>
+          </p:cNvSpPr>
+          <p:nvPr>
+            <p:ph type="ftr" sz="quarter" idx="11"/>
+          </p:nvPr>
+        </p:nvSpPr>
+        <p:spPr/>
+        <p:txBody>
+          <a:bodyPr/>
           <a:lstStyle/>
           <a:p>
-            <a:pPr>
-              <a:spcBef>
-                <a:spcPts val="0"/>
-              </a:spcBef>
-              <a:spcAft>
-                <a:spcPts val="0"/>
-              </a:spcAft>
-              <a:buSzPts val="2576"/>
-            </a:pPr>
-            <a:r>
-              <a:rPr lang="en-US" sz="2800" b="0" i="0" u="none" strike="noStrike" cap="none" dirty="0">
-                <a:solidFill>
-                  <a:schemeClr val="dk2"/>
-                </a:solidFill>
-                <a:latin typeface="Cabin"/>
-                <a:ea typeface="Cabin"/>
-                <a:cs typeface="Cabin"/>
-                <a:sym typeface="Cabin"/>
-              </a:rPr>
-              <a:t>This lesson was written by</a:t>
-            </a:r>
-            <a:r>
-              <a:rPr lang="en-US" sz="2800" dirty="0"/>
-              <a:t> the Bayou Builders (https://</a:t>
-            </a:r>
-            <a:r>
-              <a:rPr lang="en-US" sz="2800" dirty="0" err="1"/>
-              <a:t>www.bayoubuilders.org</a:t>
-            </a:r>
-            <a:r>
-              <a:rPr lang="en-US" sz="2800" dirty="0"/>
-              <a:t>/)</a:t>
-            </a:r>
-            <a:endParaRPr dirty="0"/>
-          </a:p>
-          <a:p>
-            <a:pPr>
-              <a:spcBef>
-                <a:spcPts val="1160"/>
-              </a:spcBef>
-              <a:spcAft>
-                <a:spcPts val="0"/>
-              </a:spcAft>
-              <a:buSzPts val="2576"/>
-            </a:pPr>
-            <a:r>
-              <a:rPr lang="en-US" sz="2800" b="0" i="0" u="none" strike="noStrike" cap="none" dirty="0">
-                <a:solidFill>
-                  <a:schemeClr val="dk2"/>
-                </a:solidFill>
-                <a:latin typeface="Cabin"/>
-                <a:ea typeface="Cabin"/>
-                <a:cs typeface="Cabin"/>
-                <a:sym typeface="Cabin"/>
-              </a:rPr>
-              <a:t>More lessons for FIRST LEGO League are available at </a:t>
-            </a:r>
-            <a:r>
-              <a:rPr lang="en-US" sz="2800" b="0" i="0" u="sng" strike="noStrike" cap="none" dirty="0">
-                <a:solidFill>
-                  <a:schemeClr val="hlink"/>
-                </a:solidFill>
-                <a:latin typeface="Cabin"/>
-                <a:ea typeface="Cabin"/>
-                <a:cs typeface="Cabin"/>
-                <a:sym typeface="Cabin"/>
-                <a:hlinkClick r:id="rId3"/>
-              </a:rPr>
-              <a:t>www.flltutorials.com</a:t>
-            </a:r>
-            <a:endParaRPr sz="2800" b="0" i="0" u="none" strike="noStrike" cap="none" dirty="0">
-              <a:solidFill>
-                <a:srgbClr val="0070C0"/>
-              </a:solidFill>
-              <a:latin typeface="Cabin"/>
-              <a:ea typeface="Cabin"/>
-              <a:cs typeface="Cabin"/>
-              <a:sym typeface="Cabin"/>
-            </a:endParaRPr>
-          </a:p>
-          <a:p>
-            <a:pPr marL="306000" marR="0" lvl="0" indent="-142424" algn="l" rtl="0">
-              <a:spcBef>
-                <a:spcPts val="1160"/>
-              </a:spcBef>
-              <a:spcAft>
-                <a:spcPts val="0"/>
-              </a:spcAft>
-              <a:buClr>
-                <a:schemeClr val="accent2"/>
-              </a:buClr>
-              <a:buSzPts val="2576"/>
-              <a:buFont typeface="Noto Sans Symbols"/>
-              <a:buNone/>
-            </a:pPr>
-            <a:endParaRPr sz="2800" b="0" i="0" u="none" strike="noStrike" cap="none" dirty="0">
-              <a:solidFill>
-                <a:schemeClr val="dk2"/>
-              </a:solidFill>
-              <a:latin typeface="Cabin"/>
-              <a:ea typeface="Cabin"/>
-              <a:cs typeface="Cabin"/>
-              <a:sym typeface="Cabin"/>
-            </a:endParaRPr>
-          </a:p>
-          <a:p>
-            <a:pPr marL="306000" marR="0" lvl="0" indent="-95688" algn="l" rtl="0">
-              <a:spcBef>
-                <a:spcPts val="1320"/>
-              </a:spcBef>
-              <a:spcAft>
-                <a:spcPts val="0"/>
-              </a:spcAft>
-              <a:buClr>
-                <a:schemeClr val="accent2"/>
-              </a:buClr>
-              <a:buSzPts val="3312"/>
-              <a:buFont typeface="Noto Sans Symbols"/>
-              <a:buNone/>
-            </a:pPr>
-            <a:endParaRPr sz="3600" b="0" i="0" u="none" strike="noStrike" cap="none" dirty="0">
-              <a:solidFill>
-                <a:schemeClr val="dk2"/>
-              </a:solidFill>
-              <a:latin typeface="Cabin"/>
-              <a:ea typeface="Cabin"/>
-              <a:cs typeface="Cabin"/>
-              <a:sym typeface="Cabin"/>
-            </a:endParaRPr>
-          </a:p>
-        </p:txBody>
-      </p:sp>
-      <p:sp>
-        <p:nvSpPr>
-          <p:cNvPr id="211" name="Shape 211"/>
-          <p:cNvSpPr txBox="1">
-            <a:spLocks noGrp="1"/>
-          </p:cNvSpPr>
-          <p:nvPr>
-            <p:ph type="ftr" sz="quarter" idx="11"/>
-          </p:nvPr>
-        </p:nvSpPr>
-        <p:spPr>
-          <a:prstGeom prst="rect">
-            <a:avLst/>
-          </a:prstGeom>
-          <a:noFill/>
-          <a:ln>
-            <a:noFill/>
-          </a:ln>
-        </p:spPr>
-        <p:txBody>
-          <a:bodyPr spcFirstLastPara="1" wrap="square" lIns="91425" tIns="45700" rIns="91425" bIns="45700" anchor="t" anchorCtr="0">
-            <a:noAutofit/>
-          </a:bodyPr>
+            <a:r>
+              <a:rPr lang="en-US"/>
+              <a:t>Copyright 2023, FLLTutorials.com. Last Update 5/29/2023</a:t>
+            </a:r>
+            <a:endParaRPr lang="en-US" dirty="0"/>
+          </a:p>
+        </p:txBody>
+      </p:sp>
+      <p:sp>
+        <p:nvSpPr>
+          <p:cNvPr id="5" name="Slide Number Placeholder 4">
+            <a:extLst>
+              <a:ext uri="{FF2B5EF4-FFF2-40B4-BE49-F238E27FC236}">
+                <a16:creationId xmlns:a16="http://schemas.microsoft.com/office/drawing/2014/main" id="{E7723787-8CE0-AE87-C11A-8497F6AAF3D1}"/>
+              </a:ext>
+            </a:extLst>
+          </p:cNvPr>
+          <p:cNvSpPr>
+            <a:spLocks noGrp="1"/>
+          </p:cNvSpPr>
+          <p:nvPr>
+            <p:ph type="sldNum" sz="quarter" idx="12"/>
+          </p:nvPr>
+        </p:nvSpPr>
+        <p:spPr/>
+        <p:txBody>
+          <a:bodyPr/>
           <a:lstStyle/>
           <a:p>
-            <a:pPr marL="0" marR="0" lvl="0" indent="0" algn="l" rtl="0">
-              <a:spcBef>
-                <a:spcPts val="0"/>
-              </a:spcBef>
-              <a:spcAft>
-                <a:spcPts val="0"/>
-              </a:spcAft>
-              <a:buNone/>
-            </a:pPr>
-            <a:r>
-              <a:rPr lang="en-US" sz="1800" b="0" i="0" u="none" strike="noStrike" cap="none">
-                <a:solidFill>
-                  <a:srgbClr val="2D58AC"/>
-                </a:solidFill>
-                <a:latin typeface="Cabin"/>
-                <a:ea typeface="Cabin"/>
-                <a:cs typeface="Cabin"/>
-                <a:sym typeface="Cabin"/>
-              </a:rPr>
-              <a:t>Copyright 2023, FLLTutorials.com. Last Update 5/29/2023</a:t>
-            </a:r>
-            <a:endParaRPr sz="1800" b="0" i="0" u="none" strike="noStrike" cap="none" dirty="0">
-              <a:solidFill>
-                <a:srgbClr val="2D58AC"/>
-              </a:solidFill>
-              <a:latin typeface="Cabin"/>
-              <a:ea typeface="Cabin"/>
-              <a:cs typeface="Cabin"/>
-              <a:sym typeface="Cabin"/>
-            </a:endParaRPr>
-          </a:p>
-        </p:txBody>
-      </p:sp>
-      <p:sp>
-        <p:nvSpPr>
-          <p:cNvPr id="212" name="Shape 212"/>
-          <p:cNvSpPr txBox="1">
-            <a:spLocks noGrp="1"/>
-          </p:cNvSpPr>
-          <p:nvPr>
-            <p:ph type="sldNum" sz="quarter" idx="12"/>
-          </p:nvPr>
-        </p:nvSpPr>
-        <p:spPr>
-          <a:prstGeom prst="rect">
-            <a:avLst/>
-          </a:prstGeom>
-          <a:noFill/>
-          <a:ln>
-            <a:noFill/>
-          </a:ln>
-        </p:spPr>
-        <p:txBody>
-          <a:bodyPr spcFirstLastPara="1" wrap="square" lIns="91425" tIns="45700" rIns="91425" bIns="45700" anchor="t" anchorCtr="0">
-            <a:noAutofit/>
-          </a:bodyPr>
-          <a:lstStyle/>
-          <a:p>
-            <a:pPr marL="0" marR="0" lvl="0" indent="0" algn="l" rtl="0">
-              <a:spcBef>
-                <a:spcPts val="0"/>
-              </a:spcBef>
-              <a:spcAft>
-                <a:spcPts val="0"/>
-              </a:spcAft>
-              <a:buNone/>
-            </a:pPr>
-            <a:fld id="{00000000-1234-1234-1234-123412341234}" type="slidenum">
-              <a:rPr lang="en-US" sz="1800" b="0" i="0" u="none" strike="noStrike" cap="none">
-                <a:solidFill>
-                  <a:srgbClr val="2D58AC"/>
-                </a:solidFill>
-                <a:latin typeface="Cabin"/>
-                <a:ea typeface="Cabin"/>
-                <a:cs typeface="Cabin"/>
-                <a:sym typeface="Cabin"/>
-              </a:rPr>
+            <a:fld id="{D57F1E4F-1CFF-5643-939E-217C01CDF565}" type="slidenum">
+              <a:rPr lang="en-US" smtClean="0"/>
+              <a:pPr/>
               <a:t>8</a:t>
             </a:fld>
-            <a:endParaRPr sz="1800" b="0" i="0" u="none" strike="noStrike" cap="none">
-              <a:solidFill>
-                <a:srgbClr val="2D58AC"/>
-              </a:solidFill>
-              <a:latin typeface="Cabin"/>
-              <a:ea typeface="Cabin"/>
-              <a:cs typeface="Cabin"/>
-              <a:sym typeface="Cabin"/>
-            </a:endParaRPr>
-          </a:p>
-        </p:txBody>
-      </p:sp>
-      <p:sp>
-        <p:nvSpPr>
-          <p:cNvPr id="213" name="Shape 213"/>
-          <p:cNvSpPr txBox="1"/>
-          <p:nvPr/>
-        </p:nvSpPr>
-        <p:spPr>
-          <a:xfrm>
-            <a:off x="572568" y="5047077"/>
-            <a:ext cx="7989752" cy="830997"/>
-          </a:xfrm>
-          <a:prstGeom prst="rect">
-            <a:avLst/>
-          </a:prstGeom>
-          <a:noFill/>
-          <a:ln>
-            <a:noFill/>
-          </a:ln>
-        </p:spPr>
-        <p:txBody>
-          <a:bodyPr spcFirstLastPara="1" wrap="square" lIns="91425" tIns="45700" rIns="91425" bIns="45700" anchor="t" anchorCtr="0">
-            <a:noAutofit/>
-          </a:bodyPr>
-          <a:lstStyle/>
-          <a:p>
-            <a:pPr marL="0" marR="0" lvl="0" indent="0" algn="ctr" rtl="0">
-              <a:spcBef>
-                <a:spcPts val="0"/>
-              </a:spcBef>
-              <a:spcAft>
-                <a:spcPts val="0"/>
-              </a:spcAft>
-              <a:buNone/>
-            </a:pPr>
-            <a:r>
-              <a:rPr lang="en-US" sz="2400" b="0" i="0" u="sng" strike="noStrike" cap="none">
-                <a:solidFill>
-                  <a:schemeClr val="hlink"/>
-                </a:solidFill>
-                <a:latin typeface="Cabin"/>
-                <a:ea typeface="Cabin"/>
-                <a:cs typeface="Cabin"/>
-                <a:sym typeface="Cabin"/>
-                <a:hlinkClick r:id="rId4"/>
-              </a:rPr>
-              <a:t>Creative Commons Attribution-NonCommercial-ShareAlike 4.0 International License</a:t>
-            </a:r>
-            <a:endParaRPr sz="2400" b="0" i="0" u="none" strike="noStrike" cap="none">
-              <a:solidFill>
-                <a:schemeClr val="dk1"/>
-              </a:solidFill>
-              <a:latin typeface="Cabin"/>
-              <a:ea typeface="Cabin"/>
-              <a:cs typeface="Cabin"/>
-              <a:sym typeface="Cabin"/>
-            </a:endParaRPr>
-          </a:p>
-        </p:txBody>
-      </p:sp>
-      <p:pic>
-        <p:nvPicPr>
-          <p:cNvPr id="214" name="Shape 214"/>
-          <p:cNvPicPr preferRelativeResize="0"/>
-          <p:nvPr/>
-        </p:nvPicPr>
-        <p:blipFill rotWithShape="1">
-          <a:blip r:embed="rId5">
-            <a:alphaModFix/>
-          </a:blip>
-          <a:srcRect/>
-          <a:stretch/>
-        </p:blipFill>
-        <p:spPr>
-          <a:xfrm>
-            <a:off x="3486559" y="4035813"/>
-            <a:ext cx="2552700" cy="889000"/>
-          </a:xfrm>
-          <a:prstGeom prst="rect">
-            <a:avLst/>
-          </a:prstGeom>
-          <a:noFill/>
-          <a:ln>
-            <a:noFill/>
-          </a:ln>
-        </p:spPr>
-      </p:pic>
+            <a:endParaRPr lang="en-US" dirty="0"/>
+          </a:p>
+        </p:txBody>
+      </p:sp>
     </p:spTree>
     <p:extLst>
       <p:ext uri="{BB962C8B-B14F-4D97-AF65-F5344CB8AC3E}">
-        <p14:creationId xmlns:p14="http://schemas.microsoft.com/office/powerpoint/2010/main" val="4210231749"/>
+        <p14:creationId xmlns:p14="http://schemas.microsoft.com/office/powerpoint/2010/main" val="3332926395"/>
+      </p:ext>
+    </p:extLst>
+  </p:cSld>
+  <p:clrMapOvr>
+    <a:masterClrMapping/>
+  </p:clrMapOvr>
+</p:sld>
+</file>
+
+<file path=ppt/slides/slide9.xml><?xml version="1.0" encoding="utf-8"?>
+<p:sld xmlns:a="http://schemas.openxmlformats.org/drawingml/2006/main" xmlns:r="http://schemas.openxmlformats.org/officeDocument/2006/relationships" xmlns:p="http://schemas.openxmlformats.org/presentationml/2006/main">
+  <p:cSld>
+    <p:spTree>
+      <p:nvGrpSpPr>
+        <p:cNvPr id="1" name=""/>
+        <p:cNvGrpSpPr/>
+        <p:nvPr/>
+      </p:nvGrpSpPr>
+      <p:grpSpPr>
+        <a:xfrm>
+          <a:off x="0" y="0"/>
+          <a:ext cx="0" cy="0"/>
+          <a:chOff x="0" y="0"/>
+          <a:chExt cx="0" cy="0"/>
+        </a:xfrm>
+      </p:grpSpPr>
+      <p:sp>
+        <p:nvSpPr>
+          <p:cNvPr id="2" name="Title 1">
+            <a:extLst>
+              <a:ext uri="{FF2B5EF4-FFF2-40B4-BE49-F238E27FC236}">
+                <a16:creationId xmlns:a16="http://schemas.microsoft.com/office/drawing/2014/main" id="{D8F0C54E-DC39-7A1D-6F80-2C7D973AA758}"/>
+              </a:ext>
+            </a:extLst>
+          </p:cNvPr>
+          <p:cNvSpPr>
+            <a:spLocks noGrp="1"/>
+          </p:cNvSpPr>
+          <p:nvPr>
+            <p:ph type="title"/>
+          </p:nvPr>
+        </p:nvSpPr>
+        <p:spPr/>
+        <p:txBody>
+          <a:bodyPr/>
+          <a:lstStyle/>
+          <a:p>
+            <a:r>
+              <a:rPr lang="en-US" dirty="0"/>
+              <a:t>SAMPLE JUDGE QUESTIONS</a:t>
+            </a:r>
+          </a:p>
+        </p:txBody>
+      </p:sp>
+      <p:sp>
+        <p:nvSpPr>
+          <p:cNvPr id="3" name="Content Placeholder 2">
+            <a:extLst>
+              <a:ext uri="{FF2B5EF4-FFF2-40B4-BE49-F238E27FC236}">
+                <a16:creationId xmlns:a16="http://schemas.microsoft.com/office/drawing/2014/main" id="{CC72BFF5-ADE6-58DD-5B60-8179F2288142}"/>
+              </a:ext>
+            </a:extLst>
+          </p:cNvPr>
+          <p:cNvSpPr>
+            <a:spLocks noGrp="1"/>
+          </p:cNvSpPr>
+          <p:nvPr>
+            <p:ph idx="1"/>
+          </p:nvPr>
+        </p:nvSpPr>
+        <p:spPr>
+          <a:xfrm>
+            <a:off x="448091" y="1505583"/>
+            <a:ext cx="8238707" cy="4664942"/>
+          </a:xfrm>
+        </p:spPr>
+        <p:txBody>
+          <a:bodyPr>
+            <a:normAutofit fontScale="92500" lnSpcReduction="20000"/>
+          </a:bodyPr>
+          <a:lstStyle/>
+          <a:p>
+            <a:r>
+              <a:rPr lang="en-US" sz="2400" dirty="0"/>
+              <a:t>Questions will focus on the rubric categories that the judge has not been able to complete during the rest of your judging session.</a:t>
+            </a:r>
+          </a:p>
+          <a:p>
+            <a:pPr lvl="1"/>
+            <a:r>
+              <a:rPr lang="en-US" sz="2000" dirty="0"/>
+              <a:t>Remember to include everyone and give multiple examples.</a:t>
+            </a:r>
+          </a:p>
+          <a:p>
+            <a:pPr lvl="1"/>
+            <a:r>
+              <a:rPr lang="en-US" sz="2000" dirty="0"/>
+              <a:t>Remember to go beyond just the robot game and innovation project where possible.</a:t>
+            </a:r>
+          </a:p>
+          <a:p>
+            <a:r>
+              <a:rPr lang="en-US" sz="2400" dirty="0"/>
+              <a:t>Describe a challenge your team faced this season and how you overcame it. </a:t>
+            </a:r>
+          </a:p>
+          <a:p>
+            <a:r>
+              <a:rPr lang="en-US" sz="2400" dirty="0"/>
+              <a:t>What was something your team did for fun?</a:t>
+            </a:r>
+          </a:p>
+          <a:p>
+            <a:r>
+              <a:rPr lang="en-US" sz="2400" dirty="0"/>
+              <a:t>Did you have any disagreements this season? How did you resolve it?</a:t>
+            </a:r>
+          </a:p>
+          <a:p>
+            <a:r>
+              <a:rPr lang="en-US" sz="2400" dirty="0"/>
+              <a:t>What is one thing you learned this season?</a:t>
+            </a:r>
+          </a:p>
+          <a:p>
+            <a:r>
+              <a:rPr lang="en-US" sz="2400" dirty="0"/>
+              <a:t>Did you have the opportunity to collaborate with or help another team?</a:t>
+            </a:r>
+          </a:p>
+        </p:txBody>
+      </p:sp>
+      <p:sp>
+        <p:nvSpPr>
+          <p:cNvPr id="4" name="Footer Placeholder 3">
+            <a:extLst>
+              <a:ext uri="{FF2B5EF4-FFF2-40B4-BE49-F238E27FC236}">
+                <a16:creationId xmlns:a16="http://schemas.microsoft.com/office/drawing/2014/main" id="{BC8166A2-33C1-FF25-B1C1-CFF4707CB61A}"/>
+              </a:ext>
+            </a:extLst>
+          </p:cNvPr>
+          <p:cNvSpPr>
+            <a:spLocks noGrp="1"/>
+          </p:cNvSpPr>
+          <p:nvPr>
+            <p:ph type="ftr" sz="quarter" idx="11"/>
+          </p:nvPr>
+        </p:nvSpPr>
+        <p:spPr/>
+        <p:txBody>
+          <a:bodyPr/>
+          <a:lstStyle/>
+          <a:p>
+            <a:r>
+              <a:rPr lang="en-US"/>
+              <a:t>Copyright 2023, FLLTutorials.com. Last Update 5/29/2023</a:t>
+            </a:r>
+            <a:endParaRPr lang="en-US" dirty="0"/>
+          </a:p>
+        </p:txBody>
+      </p:sp>
+      <p:sp>
+        <p:nvSpPr>
+          <p:cNvPr id="5" name="Slide Number Placeholder 4">
+            <a:extLst>
+              <a:ext uri="{FF2B5EF4-FFF2-40B4-BE49-F238E27FC236}">
+                <a16:creationId xmlns:a16="http://schemas.microsoft.com/office/drawing/2014/main" id="{F196F146-5DF5-7B89-6717-B98F357141DE}"/>
+              </a:ext>
+            </a:extLst>
+          </p:cNvPr>
+          <p:cNvSpPr>
+            <a:spLocks noGrp="1"/>
+          </p:cNvSpPr>
+          <p:nvPr>
+            <p:ph type="sldNum" sz="quarter" idx="12"/>
+          </p:nvPr>
+        </p:nvSpPr>
+        <p:spPr/>
+        <p:txBody>
+          <a:bodyPr/>
+          <a:lstStyle/>
+          <a:p>
+            <a:fld id="{D57F1E4F-1CFF-5643-939E-217C01CDF565}" type="slidenum">
+              <a:rPr lang="en-US" smtClean="0"/>
+              <a:pPr/>
+              <a:t>9</a:t>
+            </a:fld>
+            <a:endParaRPr lang="en-US" dirty="0"/>
+          </a:p>
+        </p:txBody>
+      </p:sp>
+    </p:spTree>
+    <p:extLst>
+      <p:ext uri="{BB962C8B-B14F-4D97-AF65-F5344CB8AC3E}">
+        <p14:creationId xmlns:p14="http://schemas.microsoft.com/office/powerpoint/2010/main" val="4020046001"/>
       </p:ext>
     </p:extLst>
   </p:cSld>

</xml_diff>

<commit_message>
Lessons updated with new rubrics and flowchart
</commit_message>
<xml_diff>
--- a/translations/en-us/CoreValues/CVJudging.pptx
+++ b/translations/en-us/CoreValues/CVJudging.pptx
@@ -206,7 +206,7 @@
           <a:p>
             <a:fld id="{C528CD71-4833-D241-9C24-E07BA428460D}" type="datetimeFigureOut">
               <a:rPr lang="en-US" smtClean="0"/>
-              <a:t>5/29/23</a:t>
+              <a:t>8/4/23</a:t>
             </a:fld>
             <a:endParaRPr lang="en-US"/>
           </a:p>
@@ -1476,7 +1476,7 @@
             </a:r>
             <a:fld id="{B0599773-11A5-944D-8FFA-F86809759A4D}" type="datetime1">
               <a:rPr lang="en-US" smtClean="0"/>
-              <a:t>5/29/23</a:t>
+              <a:t>8/4/23</a:t>
             </a:fld>
             <a:endParaRPr lang="en-US" dirty="0"/>
           </a:p>
@@ -1787,7 +1787,7 @@
           <a:p>
             <a:fld id="{BECF15BF-D8D0-7547-BB28-51661AFF6544}" type="datetime1">
               <a:rPr lang="en-US" smtClean="0"/>
-              <a:t>5/29/23</a:t>
+              <a:t>8/4/23</a:t>
             </a:fld>
             <a:endParaRPr lang="en-US" dirty="0"/>
           </a:p>
@@ -2046,7 +2046,7 @@
           <a:p>
             <a:fld id="{5EAF1571-E5EE-0044-B688-7B99D4F5EAC9}" type="datetime1">
               <a:rPr lang="en-US" smtClean="0"/>
-              <a:t>5/29/23</a:t>
+              <a:t>8/4/23</a:t>
             </a:fld>
             <a:endParaRPr lang="en-US" dirty="0"/>
           </a:p>
@@ -2341,7 +2341,7 @@
             </a:r>
             <a:fld id="{47FED357-F72D-6E4C-BE3D-29F42CF1AAC0}" type="datetime1">
               <a:rPr lang="en-US" smtClean="0"/>
-              <a:t>5/29/23</a:t>
+              <a:t>8/4/23</a:t>
             </a:fld>
             <a:endParaRPr lang="en-US" dirty="0"/>
           </a:p>
@@ -2795,7 +2795,7 @@
             <a:fld id="{B61BEF0D-F0BB-DE4B-95CE-6DB70DBA9567}" type="datetimeFigureOut">
               <a:rPr lang="en-US" smtClean="0"/>
               <a:pPr/>
-              <a:t>5/29/23</a:t>
+              <a:t>8/4/23</a:t>
             </a:fld>
             <a:endParaRPr lang="en-US" dirty="0"/>
           </a:p>
@@ -3301,7 +3301,7 @@
           <a:p>
             <a:fld id="{2A58A400-2A48-2C41-9893-6F2940CBC17D}" type="datetime1">
               <a:rPr lang="en-US" smtClean="0"/>
-              <a:t>5/29/23</a:t>
+              <a:t>8/4/23</a:t>
             </a:fld>
             <a:endParaRPr lang="en-US" dirty="0"/>
           </a:p>
@@ -3751,7 +3751,7 @@
           <a:p>
             <a:fld id="{2A58FEA2-5998-FB4A-B4B9-5BE8E7226281}" type="datetime1">
               <a:rPr lang="en-US" smtClean="0"/>
-              <a:t>5/29/23</a:t>
+              <a:t>8/4/23</a:t>
             </a:fld>
             <a:endParaRPr lang="en-US" dirty="0"/>
           </a:p>
@@ -3937,7 +3937,7 @@
           <a:p>
             <a:fld id="{BCBDF66C-1B4D-A540-BF9A-9F0A78123139}" type="datetime1">
               <a:rPr lang="en-US" smtClean="0"/>
-              <a:t>5/29/23</a:t>
+              <a:t>8/4/23</a:t>
             </a:fld>
             <a:endParaRPr lang="en-US" dirty="0"/>
           </a:p>
@@ -4069,7 +4069,7 @@
           <a:p>
             <a:fld id="{278540D9-4CD3-C64D-8BFE-A43F289C7C50}" type="datetime1">
               <a:rPr lang="en-US" smtClean="0"/>
-              <a:t>5/29/23</a:t>
+              <a:t>8/4/23</a:t>
             </a:fld>
             <a:endParaRPr lang="en-US" dirty="0"/>
           </a:p>
@@ -4476,7 +4476,7 @@
           <a:p>
             <a:fld id="{81816BA6-22FC-7643-9B94-074ACF885DDE}" type="datetime1">
               <a:rPr lang="en-US" smtClean="0"/>
-              <a:t>5/29/23</a:t>
+              <a:t>8/4/23</a:t>
             </a:fld>
             <a:endParaRPr lang="en-US" dirty="0"/>
           </a:p>
@@ -4794,7 +4794,7 @@
           <a:p>
             <a:fld id="{446FCB52-0199-1646-B4EA-AB538ADB02C3}" type="datetime1">
               <a:rPr lang="en-US" smtClean="0"/>
-              <a:t>5/29/23</a:t>
+              <a:t>8/4/23</a:t>
             </a:fld>
             <a:endParaRPr lang="en-US" dirty="0"/>
           </a:p>
@@ -5154,7 +5154,7 @@
             </a:r>
             <a:fld id="{FAA321E8-DDA5-504D-8DAC-E0DBE3176D51}" type="datetime1">
               <a:rPr lang="en-US" smtClean="0"/>
-              <a:t>5/29/23</a:t>
+              <a:t>8/4/23</a:t>
             </a:fld>
             <a:endParaRPr lang="en-US" dirty="0"/>
           </a:p>
@@ -6878,10 +6878,10 @@
       </p:sp>
       <p:pic>
         <p:nvPicPr>
-          <p:cNvPr id="7" name="Picture 6" descr="Chart&#10;&#10;Description automatically generated with low confidence">
+          <p:cNvPr id="4" name="Picture 3" descr="A diagram of a team&#10;&#10;Description automatically generated">
             <a:extLst>
               <a:ext uri="{FF2B5EF4-FFF2-40B4-BE49-F238E27FC236}">
-                <a16:creationId xmlns:a16="http://schemas.microsoft.com/office/drawing/2014/main" id="{87F3C499-C6A7-2D4D-6A93-648916FB0FA9}"/>
+                <a16:creationId xmlns:a16="http://schemas.microsoft.com/office/drawing/2014/main" id="{C3E9A195-9658-E05A-1595-BDCF2CF7B532}"/>
               </a:ext>
             </a:extLst>
           </p:cNvPr>
@@ -6898,8 +6898,8 @@
         </p:blipFill>
         <p:spPr>
           <a:xfrm>
-            <a:off x="5000014" y="1505560"/>
-            <a:ext cx="3852711" cy="5169877"/>
+            <a:off x="4973388" y="1505583"/>
+            <a:ext cx="3722520" cy="5029200"/>
           </a:xfrm>
           <a:prstGeom prst="rect">
             <a:avLst/>
@@ -7019,7 +7019,7 @@
             </a:pPr>
             <a:r>
               <a:rPr lang="en-US" sz="2400" dirty="0"/>
-              <a:t>Core Values judging is a lot of fun. It is your team’s chance to share its identity.  </a:t>
+              <a:t>Share your goals and why being a part of FIRST is important to you. </a:t>
             </a:r>
           </a:p>
           <a:p>
@@ -7033,24 +7033,63 @@
               <a:buSzPts val="2208"/>
             </a:pPr>
             <a:r>
-              <a:rPr lang="en-US" sz="2400" dirty="0"/>
-              <a:t>It is your chance to share your team goals and why being a part of FLL is important to you. These are some things you can cover in the Team Welcome.</a:t>
-            </a:r>
-            <a:endParaRPr sz="2400" dirty="0"/>
-          </a:p>
-          <a:p>
-            <a:pPr marL="0" marR="0" lvl="0" indent="0" algn="l" rtl="0">
+              <a:rPr lang="en-US" sz="2400" b="0" i="0" u="none" strike="noStrike" cap="none" dirty="0">
+                <a:solidFill>
+                  <a:schemeClr val="dk2"/>
+                </a:solidFill>
+                <a:latin typeface="Cabin"/>
+                <a:ea typeface="Cabin"/>
+                <a:cs typeface="Cabin"/>
+                <a:sym typeface="Cabin"/>
+              </a:rPr>
+              <a:t>Share </a:t>
+            </a:r>
+            <a:r>
+              <a:rPr lang="en-US" sz="2400" dirty="0">
+                <a:solidFill>
+                  <a:schemeClr val="dk2"/>
+                </a:solidFill>
+                <a:latin typeface="Cabin"/>
+                <a:ea typeface="Cabin"/>
+                <a:cs typeface="Cabin"/>
+                <a:sym typeface="Cabin"/>
+              </a:rPr>
+              <a:t>your team’s identity.</a:t>
+            </a:r>
+          </a:p>
+          <a:p>
+            <a:pPr marL="342900" lvl="1" indent="-342900">
               <a:spcBef>
                 <a:spcPts val="0"/>
               </a:spcBef>
               <a:spcAft>
                 <a:spcPts val="0"/>
               </a:spcAft>
-              <a:buNone/>
+              <a:buSzPts val="2208"/>
             </a:pPr>
             <a:r>
-              <a:rPr lang="en-US" sz="2400" dirty="0"/>
-              <a:t> </a:t>
+              <a:rPr lang="en-US" sz="2400" b="0" i="0" u="none" strike="noStrike" cap="none" dirty="0">
+                <a:solidFill>
+                  <a:schemeClr val="dk2"/>
+                </a:solidFill>
+                <a:latin typeface="Cabin"/>
+                <a:ea typeface="Cabin"/>
+                <a:cs typeface="Cabin"/>
+                <a:sym typeface="Cabin"/>
+              </a:rPr>
+              <a:t>Share specific (and multiple) examples of how your </a:t>
+            </a:r>
+            <a:r>
+              <a:rPr lang="en-US" sz="2400" dirty="0">
+                <a:solidFill>
+                  <a:schemeClr val="dk2"/>
+                </a:solidFill>
+                <a:latin typeface="Cabin"/>
+                <a:ea typeface="Cabin"/>
+                <a:cs typeface="Cabin"/>
+                <a:sym typeface="Cabin"/>
+              </a:rPr>
+              <a:t>team used the Core Values all season.</a:t>
             </a:r>
             <a:endParaRPr sz="2400" b="0" i="0" u="none" strike="noStrike" cap="none" dirty="0">
               <a:solidFill>
@@ -7456,10 +7495,10 @@
       </p:sp>
       <p:pic>
         <p:nvPicPr>
-          <p:cNvPr id="4" name="Picture 3" descr="Chart, bar chart&#10;&#10;Description automatically generated">
+          <p:cNvPr id="5" name="Picture 4" descr="A pink and white survey&#10;&#10;Description automatically generated">
             <a:extLst>
               <a:ext uri="{FF2B5EF4-FFF2-40B4-BE49-F238E27FC236}">
-                <a16:creationId xmlns:a16="http://schemas.microsoft.com/office/drawing/2014/main" id="{274CD818-838F-BEC8-D89E-678EAF11ED71}"/>
+                <a16:creationId xmlns:a16="http://schemas.microsoft.com/office/drawing/2014/main" id="{186D73BF-F132-4298-F5E9-74763B015175}"/>
               </a:ext>
             </a:extLst>
           </p:cNvPr>
@@ -7468,15 +7507,16 @@
           </p:cNvPicPr>
           <p:nvPr/>
         </p:nvPicPr>
-        <p:blipFill rotWithShape="1">
+        <p:blipFill>
           <a:blip r:embed="rId3"/>
-          <a:srcRect r="26728"/>
-          <a:stretch/>
+          <a:stretch>
+            <a:fillRect/>
+          </a:stretch>
         </p:blipFill>
         <p:spPr>
           <a:xfrm>
-            <a:off x="5006169" y="2006767"/>
-            <a:ext cx="3564775" cy="3350846"/>
+            <a:off x="4908684" y="2426690"/>
+            <a:ext cx="3787225" cy="2607792"/>
           </a:xfrm>
           <a:prstGeom prst="rect">
             <a:avLst/>
@@ -7587,7 +7627,7 @@
             </a:pPr>
             <a:r>
               <a:rPr lang="en-US" sz="2400" dirty="0"/>
-              <a:t>You may create a Core Values Poster to help you remember your season or as a visual for your judges.</a:t>
+              <a:t>Some teams create a Core Values Poster to help you remember your season or as a visual for your judges.</a:t>
             </a:r>
           </a:p>
           <a:p>
@@ -7602,7 +7642,7 @@
             </a:pPr>
             <a:r>
               <a:rPr lang="en-US" sz="2400" dirty="0"/>
-              <a:t>You may also consider a Core Values Journal where you document your team’s activities </a:t>
+              <a:t>Some teams create Core Values Journal where you document your team’s activities </a:t>
             </a:r>
           </a:p>
         </p:txBody>

</xml_diff>